<commit_message>
Photon Room Exit Settings
- Create and destroy damage effects

- Health Settings and Health Sync
</commit_message>
<xml_diff>
--- a/Assets/Class/Animator & Blend Tree/PPT Data/Animation Example.pptx
+++ b/Assets/Class/Animator & Blend Tree/PPT Data/Animation Example.pptx
@@ -2,36 +2,36 @@
 <file path=ppt/presentation.xml><?xml version="1.0" encoding="utf-8"?>
 <p:presentation xmlns:a="http://schemas.openxmlformats.org/drawingml/2006/main" xmlns:r="http://schemas.openxmlformats.org/officeDocument/2006/relationships" xmlns:p="http://schemas.openxmlformats.org/presentationml/2006/main" xmlns:p14="http://schemas.microsoft.com/office/powerpoint/2010/main" saveSubsetFonts="1" firstSlideNum="0">
   <p:sldMasterIdLst>
-    <p:sldMasterId id="2147486209" r:id="rId12"/>
+    <p:sldMasterId id="2147486214" r:id="rId12"/>
   </p:sldMasterIdLst>
   <p:notesMasterIdLst>
     <p:notesMasterId r:id="rId14"/>
   </p:notesMasterIdLst>
   <p:sldIdLst>
     <p:sldId id="294" r:id="rId16"/>
-    <p:sldId id="295" r:id="rId17"/>
-    <p:sldId id="296" r:id="rId18"/>
-    <p:sldId id="316" r:id="rId19"/>
-    <p:sldId id="291" r:id="rId20"/>
-    <p:sldId id="297" r:id="rId21"/>
-    <p:sldId id="298" r:id="rId22"/>
-    <p:sldId id="299" r:id="rId23"/>
-    <p:sldId id="300" r:id="rId24"/>
-    <p:sldId id="301" r:id="rId25"/>
-    <p:sldId id="302" r:id="rId26"/>
-    <p:sldId id="292" r:id="rId27"/>
-    <p:sldId id="303" r:id="rId28"/>
-    <p:sldId id="304" r:id="rId29"/>
-    <p:sldId id="306" r:id="rId30"/>
-    <p:sldId id="307" r:id="rId31"/>
-    <p:sldId id="308" r:id="rId32"/>
-    <p:sldId id="309" r:id="rId33"/>
-    <p:sldId id="310" r:id="rId34"/>
-    <p:sldId id="311" r:id="rId35"/>
-    <p:sldId id="312" r:id="rId36"/>
-    <p:sldId id="313" r:id="rId37"/>
-    <p:sldId id="314" r:id="rId38"/>
-    <p:sldId id="315" r:id="rId39"/>
+    <p:sldId id="295" r:id="rId18"/>
+    <p:sldId id="296" r:id="rId20"/>
+    <p:sldId id="316" r:id="rId22"/>
+    <p:sldId id="291" r:id="rId24"/>
+    <p:sldId id="297" r:id="rId25"/>
+    <p:sldId id="298" r:id="rId26"/>
+    <p:sldId id="299" r:id="rId28"/>
+    <p:sldId id="300" r:id="rId30"/>
+    <p:sldId id="301" r:id="rId31"/>
+    <p:sldId id="302" r:id="rId32"/>
+    <p:sldId id="292" r:id="rId33"/>
+    <p:sldId id="303" r:id="rId35"/>
+    <p:sldId id="304" r:id="rId36"/>
+    <p:sldId id="306" r:id="rId37"/>
+    <p:sldId id="307" r:id="rId39"/>
+    <p:sldId id="308" r:id="rId41"/>
+    <p:sldId id="309" r:id="rId43"/>
+    <p:sldId id="310" r:id="rId45"/>
+    <p:sldId id="311" r:id="rId47"/>
+    <p:sldId id="312" r:id="rId49"/>
+    <p:sldId id="313" r:id="rId51"/>
+    <p:sldId id="314" r:id="rId53"/>
+    <p:sldId id="315" r:id="rId55"/>
   </p:sldIdLst>
   <p:sldSz cx="12192000" cy="6858000"/>
   <p:notesSz cx="6858000" cy="9144000"/>
@@ -9303,8 +9303,8 @@
         </p:nvSpPr>
         <p:spPr>
           <a:xfrm rot="0">
-            <a:off x="6835775" y="3246120"/>
-            <a:ext cx="4166235" cy="677545"/>
+            <a:off x="6835775" y="5537835"/>
+            <a:ext cx="4166870" cy="678180"/>
           </a:xfrm>
           <a:prstGeom prst="rect"/>
           <a:noFill/>
@@ -9357,8 +9357,8 @@
         </p:nvSpPr>
         <p:spPr>
           <a:xfrm rot="0">
-            <a:off x="1184275" y="2667000"/>
-            <a:ext cx="4166235" cy="677545"/>
+            <a:off x="1184275" y="2752725"/>
+            <a:ext cx="4166870" cy="678180"/>
           </a:xfrm>
           <a:prstGeom prst="rect"/>
           <a:noFill/>
@@ -9403,14 +9403,138 @@
       </p:sp>
       <p:pic>
         <p:nvPicPr>
-          <p:cNvPr id="1171" name="그림 173"/>
+          <p:cNvPr id="1171" name="그림 173" descr="C:/Users/Admin1/AppData/Roaming/PolarisOffice/ETemp/9880_20815312/fImage226374495447.png"/>
           <p:cNvPicPr>
             <a:picLocks noChangeAspect="1"/>
           </p:cNvPicPr>
           <p:nvPr/>
         </p:nvPicPr>
         <p:blipFill rotWithShape="1">
-          <a:blip r:embed="rId2" cstate="print">
+          <a:blip r:embed="rId2" cstate="hqprint">
+            <a:extLst>
+              <a:ext uri="{28A0092B-C50C-407E-A947-70E740481C1C}">
+                <a14:useLocalDpi xmlns:a14="http://schemas.microsoft.com/office/drawing/2010/main"/>
+              </a:ext>
+            </a:extLst>
+          </a:blip>
+          <a:stretch>
+            <a:fillRect/>
+          </a:stretch>
+        </p:blipFill>
+        <p:spPr>
+          <a:xfrm rot="0">
+            <a:off x="1179195" y="1542415"/>
+            <a:ext cx="2012315" cy="1048385"/>
+          </a:xfrm>
+          <a:prstGeom prst="roundRect"/>
+          <a:solidFill>
+            <a:srgbClr val="EDEDED"/>
+          </a:solidFill>
+        </p:spPr>
+      </p:pic>
+      <p:pic>
+        <p:nvPicPr>
+          <p:cNvPr id="1176" name="그림 180" descr="C:/Users/Admin1/AppData/Roaming/PolarisOffice/ETemp/9880_20815312/fImage40644541726.png"/>
+          <p:cNvPicPr>
+            <a:picLocks noChangeAspect="1"/>
+          </p:cNvPicPr>
+          <p:nvPr/>
+        </p:nvPicPr>
+        <p:blipFill rotWithShape="1">
+          <a:blip r:embed="rId3" cstate="hqprint">
+            <a:extLst>
+              <a:ext uri="{28A0092B-C50C-407E-A947-70E740481C1C}">
+                <a14:useLocalDpi xmlns:a14="http://schemas.microsoft.com/office/drawing/2010/main"/>
+              </a:ext>
+            </a:extLst>
+          </a:blip>
+          <a:stretch>
+            <a:fillRect/>
+          </a:stretch>
+        </p:blipFill>
+        <p:spPr>
+          <a:xfrm rot="0">
+            <a:off x="4484370" y="1543050"/>
+            <a:ext cx="868045" cy="1048385"/>
+          </a:xfrm>
+          <a:prstGeom prst="roundRect"/>
+          <a:solidFill>
+            <a:srgbClr val="EDEDED"/>
+          </a:solidFill>
+        </p:spPr>
+      </p:pic>
+      <p:pic>
+        <p:nvPicPr>
+          <p:cNvPr id="1177" name="그림 181" descr="C:/Users/Admin1/AppData/Roaming/PolarisOffice/ETemp/9880_20815312/fImage41594554771.png"/>
+          <p:cNvPicPr>
+            <a:picLocks noChangeAspect="1"/>
+          </p:cNvPicPr>
+          <p:nvPr/>
+        </p:nvPicPr>
+        <p:blipFill rotWithShape="1">
+          <a:blip r:embed="rId4" cstate="hqprint">
+            <a:extLst>
+              <a:ext uri="{28A0092B-C50C-407E-A947-70E740481C1C}">
+                <a14:useLocalDpi xmlns:a14="http://schemas.microsoft.com/office/drawing/2010/main"/>
+              </a:ext>
+            </a:extLst>
+          </a:blip>
+          <a:stretch>
+            <a:fillRect/>
+          </a:stretch>
+        </p:blipFill>
+        <p:spPr>
+          <a:xfrm rot="0">
+            <a:off x="3480435" y="1543050"/>
+            <a:ext cx="842010" cy="1056640"/>
+          </a:xfrm>
+          <a:prstGeom prst="roundRect"/>
+          <a:solidFill>
+            <a:srgbClr val="EDEDED"/>
+          </a:solidFill>
+        </p:spPr>
+      </p:pic>
+      <p:pic>
+        <p:nvPicPr>
+          <p:cNvPr id="1178" name="그림 186" descr="C:/Users/Admin1/AppData/Roaming/PolarisOffice/ETemp/9880_20815312/fImage61714561538.png"/>
+          <p:cNvPicPr>
+            <a:picLocks noChangeAspect="1"/>
+          </p:cNvPicPr>
+          <p:nvPr/>
+        </p:nvPicPr>
+        <p:blipFill rotWithShape="1">
+          <a:blip r:embed="rId5" cstate="hqprint">
+            <a:extLst>
+              <a:ext uri="{28A0092B-C50C-407E-A947-70E740481C1C}">
+                <a14:useLocalDpi xmlns:a14="http://schemas.microsoft.com/office/drawing/2010/main"/>
+              </a:ext>
+            </a:extLst>
+          </a:blip>
+          <a:stretch>
+            <a:fillRect/>
+          </a:stretch>
+        </p:blipFill>
+        <p:spPr>
+          <a:xfrm rot="0">
+            <a:off x="6843395" y="3380105"/>
+            <a:ext cx="4167505" cy="2034540"/>
+          </a:xfrm>
+          <a:prstGeom prst="roundRect"/>
+          <a:solidFill>
+            <a:srgbClr val="EDEDED"/>
+          </a:solidFill>
+        </p:spPr>
+      </p:pic>
+      <p:pic>
+        <p:nvPicPr>
+          <p:cNvPr id="1179" name="그림 189"/>
+          <p:cNvPicPr>
+            <a:picLocks noChangeAspect="1"/>
+          </p:cNvPicPr>
+          <p:nvPr/>
+        </p:nvPicPr>
+        <p:blipFill rotWithShape="1">
+          <a:blip r:embed="rId6" cstate="print">
             <a:extLst>
               <a:ext uri="{28A0092B-C50C-407E-A947-70E740481C1C}">
                 <a14:useLocalDpi xmlns:a14="http://schemas.microsoft.com/office/drawing/2010/main" val="0"/>
@@ -9423,8 +9547,8 @@
         </p:blipFill>
         <p:spPr>
           <a:xfrm rot="0">
-            <a:off x="1179195" y="1542415"/>
-            <a:ext cx="1515110" cy="962660"/>
+            <a:off x="8183245" y="1801495"/>
+            <a:ext cx="2818765" cy="1350645"/>
           </a:xfrm>
           <a:prstGeom prst="roundRect"/>
           <a:solidFill>
@@ -9432,9 +9556,71 @@
           </a:solidFill>
         </p:spPr>
       </p:pic>
-      <p:sp>
-        <p:nvSpPr>
-          <p:cNvPr id="1172" name="도형 176"/>
+      <p:pic>
+        <p:nvPicPr>
+          <p:cNvPr id="1180" name="그림 190"/>
+          <p:cNvPicPr>
+            <a:picLocks noChangeAspect="1"/>
+          </p:cNvPicPr>
+          <p:nvPr/>
+        </p:nvPicPr>
+        <p:blipFill rotWithShape="1">
+          <a:blip r:embed="rId7" cstate="print">
+            <a:extLst>
+              <a:ext uri="{28A0092B-C50C-407E-A947-70E740481C1C}">
+                <a14:useLocalDpi xmlns:a14="http://schemas.microsoft.com/office/drawing/2010/main" val="0"/>
+              </a:ext>
+            </a:extLst>
+          </a:blip>
+          <a:stretch>
+            <a:fillRect/>
+          </a:stretch>
+        </p:blipFill>
+        <p:spPr>
+          <a:xfrm rot="0">
+            <a:off x="6832600" y="2627630"/>
+            <a:ext cx="867410" cy="516255"/>
+          </a:xfrm>
+          <a:prstGeom prst="roundRect"/>
+          <a:solidFill>
+            <a:srgbClr val="EDEDED"/>
+          </a:solidFill>
+        </p:spPr>
+      </p:pic>
+      <p:pic>
+        <p:nvPicPr>
+          <p:cNvPr id="1181" name="그림 191"/>
+          <p:cNvPicPr>
+            <a:picLocks noChangeAspect="1"/>
+          </p:cNvPicPr>
+          <p:nvPr/>
+        </p:nvPicPr>
+        <p:blipFill rotWithShape="1">
+          <a:blip r:embed="rId8" cstate="print">
+            <a:extLst>
+              <a:ext uri="{28A0092B-C50C-407E-A947-70E740481C1C}">
+                <a14:useLocalDpi xmlns:a14="http://schemas.microsoft.com/office/drawing/2010/main" val="0"/>
+              </a:ext>
+            </a:extLst>
+          </a:blip>
+          <a:stretch>
+            <a:fillRect/>
+          </a:stretch>
+        </p:blipFill>
+        <p:spPr>
+          <a:xfrm rot="0">
+            <a:off x="6835140" y="1811020"/>
+            <a:ext cx="841375" cy="586740"/>
+          </a:xfrm>
+          <a:prstGeom prst="roundRect"/>
+          <a:solidFill>
+            <a:srgbClr val="EDEDED"/>
+          </a:solidFill>
+        </p:spPr>
+      </p:pic>
+      <p:sp>
+        <p:nvSpPr>
+          <p:cNvPr id="1182" name="도형 192"/>
           <p:cNvSpPr>
             <a:spLocks/>
           </p:cNvSpPr>
@@ -9442,20 +9628,10 @@
         </p:nvSpPr>
         <p:spPr>
           <a:xfrm rot="0">
-            <a:off x="2843530" y="1897380"/>
-            <a:ext cx="363855" cy="264160"/>
-          </a:xfrm>
-          <a:prstGeom prst="notchedRightArrow"/>
-          <a:scene3d>
-            <a:camera prst="orthographicFront"/>
-            <a:lightRig rig="threePt" dir="t"/>
-          </a:scene3d>
-          <a:sp3d prstMaterial="warmMatte">
-            <a:bevelT w="76200" h="76200" prst="circle"/>
-            <a:contourClr>
-              <a:srgbClr val="000000"/>
-            </a:contourClr>
-          </a:sp3d>
+            <a:off x="7174865" y="1549400"/>
+            <a:ext cx="3018155" cy="515620"/>
+          </a:xfrm>
+          <a:prstGeom prst="curvedDownArrow"/>
         </p:spPr>
         <p:style>
           <a:lnRef idx="2">
@@ -9474,15 +9650,12 @@
           </a:fontRef>
         </p:style>
         <p:txBody>
-          <a:bodyPr wrap="square" lIns="91440" tIns="45720" rIns="91440" bIns="45720" numCol="1" vert="horz" anchor="ctr">
+          <a:bodyPr wrap="square" lIns="91440" tIns="45720" rIns="91440" bIns="45720" vert="horz" anchor="ctr">
             <a:noAutofit/>
           </a:bodyPr>
           <a:lstStyle/>
           <a:p>
-            <a:pPr marL="0" indent="0" algn="ctr" latinLnBrk="0" hangingPunct="1">
-              <a:buFontTx/>
-              <a:buNone/>
-            </a:pPr>
+            <a:pPr marL="0" indent="0" algn="ctr" hangingPunct="1"/>
             <a:endParaRPr lang="ko-KR" altLang="en-US" sz="1800">
               <a:latin typeface="맑은 고딕" charset="0"/>
               <a:ea typeface="맑은 고딕" charset="0"/>
@@ -9490,195 +9663,9 @@
           </a:p>
         </p:txBody>
       </p:sp>
-      <p:pic>
-        <p:nvPicPr>
-          <p:cNvPr id="1176" name="그림 180"/>
-          <p:cNvPicPr>
-            <a:picLocks noChangeAspect="1"/>
-          </p:cNvPicPr>
-          <p:nvPr/>
-        </p:nvPicPr>
-        <p:blipFill rotWithShape="1">
-          <a:blip r:embed="rId3" cstate="print">
-            <a:extLst>
-              <a:ext uri="{28A0092B-C50C-407E-A947-70E740481C1C}">
-                <a14:useLocalDpi xmlns:a14="http://schemas.microsoft.com/office/drawing/2010/main" val="0"/>
-              </a:ext>
-            </a:extLst>
-          </a:blip>
-          <a:stretch>
-            <a:fillRect/>
-          </a:stretch>
-        </p:blipFill>
-        <p:spPr>
-          <a:xfrm rot="0">
-            <a:off x="4474845" y="1627505"/>
-            <a:ext cx="867410" cy="794385"/>
-          </a:xfrm>
-          <a:prstGeom prst="roundRect"/>
-          <a:solidFill>
-            <a:srgbClr val="EDEDED"/>
-          </a:solidFill>
-        </p:spPr>
-      </p:pic>
-      <p:pic>
-        <p:nvPicPr>
-          <p:cNvPr id="1177" name="그림 181"/>
-          <p:cNvPicPr>
-            <a:picLocks noChangeAspect="1"/>
-          </p:cNvPicPr>
-          <p:nvPr/>
-        </p:nvPicPr>
-        <p:blipFill rotWithShape="1">
-          <a:blip r:embed="rId4" cstate="print">
-            <a:extLst>
-              <a:ext uri="{28A0092B-C50C-407E-A947-70E740481C1C}">
-                <a14:useLocalDpi xmlns:a14="http://schemas.microsoft.com/office/drawing/2010/main" val="0"/>
-              </a:ext>
-            </a:extLst>
-          </a:blip>
-          <a:stretch>
-            <a:fillRect/>
-          </a:stretch>
-        </p:blipFill>
-        <p:spPr>
-          <a:xfrm rot="0">
-            <a:off x="3413760" y="1628140"/>
-            <a:ext cx="841375" cy="791210"/>
-          </a:xfrm>
-          <a:prstGeom prst="roundRect"/>
-          <a:solidFill>
-            <a:srgbClr val="EDEDED"/>
-          </a:solidFill>
-        </p:spPr>
-      </p:pic>
-      <p:pic>
-        <p:nvPicPr>
-          <p:cNvPr id="1178" name="그림 186"/>
-          <p:cNvPicPr>
-            <a:picLocks noChangeAspect="1"/>
-          </p:cNvPicPr>
-          <p:nvPr/>
-        </p:nvPicPr>
-        <p:blipFill rotWithShape="1">
-          <a:blip r:embed="rId5" cstate="print">
-            <a:extLst>
-              <a:ext uri="{28A0092B-C50C-407E-A947-70E740481C1C}">
-                <a14:useLocalDpi xmlns:a14="http://schemas.microsoft.com/office/drawing/2010/main" val="0"/>
-              </a:ext>
-            </a:extLst>
-          </a:blip>
-          <a:stretch>
-            <a:fillRect/>
-          </a:stretch>
-        </p:blipFill>
-        <p:spPr>
-          <a:xfrm rot="0">
-            <a:off x="6843395" y="4080510"/>
-            <a:ext cx="4158615" cy="1654175"/>
-          </a:xfrm>
-          <a:prstGeom prst="roundRect"/>
-          <a:solidFill>
-            <a:srgbClr val="EDEDED"/>
-          </a:solidFill>
-        </p:spPr>
-      </p:pic>
-      <p:pic>
-        <p:nvPicPr>
-          <p:cNvPr id="1179" name="그림 189"/>
-          <p:cNvPicPr>
-            <a:picLocks noChangeAspect="1"/>
-          </p:cNvPicPr>
-          <p:nvPr/>
-        </p:nvPicPr>
-        <p:blipFill rotWithShape="1">
-          <a:blip r:embed="rId6" cstate="print">
-            <a:extLst>
-              <a:ext uri="{28A0092B-C50C-407E-A947-70E740481C1C}">
-                <a14:useLocalDpi xmlns:a14="http://schemas.microsoft.com/office/drawing/2010/main" val="0"/>
-              </a:ext>
-            </a:extLst>
-          </a:blip>
-          <a:stretch>
-            <a:fillRect/>
-          </a:stretch>
-        </p:blipFill>
-        <p:spPr>
-          <a:xfrm rot="0">
-            <a:off x="8183245" y="1801495"/>
-            <a:ext cx="2818765" cy="1350645"/>
-          </a:xfrm>
-          <a:prstGeom prst="roundRect"/>
-          <a:solidFill>
-            <a:srgbClr val="EDEDED"/>
-          </a:solidFill>
-        </p:spPr>
-      </p:pic>
-      <p:pic>
-        <p:nvPicPr>
-          <p:cNvPr id="1180" name="그림 190"/>
-          <p:cNvPicPr>
-            <a:picLocks noChangeAspect="1"/>
-          </p:cNvPicPr>
-          <p:nvPr/>
-        </p:nvPicPr>
-        <p:blipFill rotWithShape="1">
-          <a:blip r:embed="rId7" cstate="print">
-            <a:extLst>
-              <a:ext uri="{28A0092B-C50C-407E-A947-70E740481C1C}">
-                <a14:useLocalDpi xmlns:a14="http://schemas.microsoft.com/office/drawing/2010/main" val="0"/>
-              </a:ext>
-            </a:extLst>
-          </a:blip>
-          <a:stretch>
-            <a:fillRect/>
-          </a:stretch>
-        </p:blipFill>
-        <p:spPr>
-          <a:xfrm rot="0">
-            <a:off x="6832600" y="2627630"/>
-            <a:ext cx="867410" cy="516255"/>
-          </a:xfrm>
-          <a:prstGeom prst="roundRect"/>
-          <a:solidFill>
-            <a:srgbClr val="EDEDED"/>
-          </a:solidFill>
-        </p:spPr>
-      </p:pic>
-      <p:pic>
-        <p:nvPicPr>
-          <p:cNvPr id="1181" name="그림 191"/>
-          <p:cNvPicPr>
-            <a:picLocks noChangeAspect="1"/>
-          </p:cNvPicPr>
-          <p:nvPr/>
-        </p:nvPicPr>
-        <p:blipFill rotWithShape="1">
-          <a:blip r:embed="rId8" cstate="print">
-            <a:extLst>
-              <a:ext uri="{28A0092B-C50C-407E-A947-70E740481C1C}">
-                <a14:useLocalDpi xmlns:a14="http://schemas.microsoft.com/office/drawing/2010/main" val="0"/>
-              </a:ext>
-            </a:extLst>
-          </a:blip>
-          <a:stretch>
-            <a:fillRect/>
-          </a:stretch>
-        </p:blipFill>
-        <p:spPr>
-          <a:xfrm rot="0">
-            <a:off x="6835140" y="1811020"/>
-            <a:ext cx="841375" cy="586740"/>
-          </a:xfrm>
-          <a:prstGeom prst="roundRect"/>
-          <a:solidFill>
-            <a:srgbClr val="EDEDED"/>
-          </a:solidFill>
-        </p:spPr>
-      </p:pic>
-      <p:sp>
-        <p:nvSpPr>
-          <p:cNvPr id="1182" name="도형 192"/>
+      <p:sp>
+        <p:nvSpPr>
+          <p:cNvPr id="1183" name="도형 193"/>
           <p:cNvSpPr>
             <a:spLocks/>
           </p:cNvSpPr>
@@ -9686,7 +9673,7 @@
         </p:nvSpPr>
         <p:spPr>
           <a:xfrm rot="0">
-            <a:off x="7174865" y="1549400"/>
+            <a:off x="7174865" y="2319655"/>
             <a:ext cx="3018155" cy="515620"/>
           </a:xfrm>
           <a:prstGeom prst="curvedDownArrow"/>
@@ -9723,42 +9710,51 @@
       </p:sp>
       <p:sp>
         <p:nvSpPr>
-          <p:cNvPr id="1183" name="도형 193"/>
-          <p:cNvSpPr>
+          <p:cNvPr id="1188" name="텍스트 상자 204"/>
+          <p:cNvSpPr txBox="1">
             <a:spLocks/>
           </p:cNvSpPr>
           <p:nvPr/>
         </p:nvSpPr>
         <p:spPr>
           <a:xfrm rot="0">
-            <a:off x="7174865" y="2319655"/>
-            <a:ext cx="3018155" cy="515620"/>
-          </a:xfrm>
-          <a:prstGeom prst="curvedDownArrow"/>
-        </p:spPr>
-        <p:style>
-          <a:lnRef idx="2">
-            <a:schemeClr val="accent1">
-              <a:shade val="50000"/>
-            </a:schemeClr>
-          </a:lnRef>
-          <a:fillRef idx="1">
-            <a:schemeClr val="accent1"/>
-          </a:fillRef>
-          <a:effectRef idx="0">
-            <a:schemeClr val="accent1"/>
-          </a:effectRef>
-          <a:fontRef idx="minor">
-            <a:schemeClr val="lt1"/>
-          </a:fontRef>
-        </p:style>
-        <p:txBody>
-          <a:bodyPr wrap="square" lIns="91440" tIns="45720" rIns="91440" bIns="45720" vert="horz" anchor="ctr">
-            <a:noAutofit/>
+            <a:off x="1184275" y="5262880"/>
+            <a:ext cx="4159885" cy="954405"/>
+          </a:xfrm>
+          <a:prstGeom prst="rect"/>
+          <a:noFill/>
+          <a:ln w="0">
+            <a:noFill/>
+            <a:prstDash/>
+          </a:ln>
+        </p:spPr>
+        <p:txBody>
+          <a:bodyPr wrap="square" lIns="89535" tIns="46355" rIns="89535" bIns="46355" numCol="1" vert="horz" anchor="t">
+            <a:spAutoFit/>
           </a:bodyPr>
           <a:lstStyle/>
           <a:p>
-            <a:pPr marL="0" indent="0" algn="ctr" hangingPunct="1"/>
+            <a:pPr marL="0" indent="0" algn="l" latinLnBrk="0" hangingPunct="1">
+              <a:buFontTx/>
+              <a:buNone/>
+            </a:pPr>
+            <a:r>
+              <a:rPr lang="ko-KR" sz="2000" b="1">
+                <a:solidFill>
+                  <a:srgbClr val="0611F2"/>
+                </a:solidFill>
+                <a:latin typeface="맑은 고딕" charset="0"/>
+                <a:ea typeface="맑은 고딕" charset="0"/>
+              </a:rPr>
+              <a:t>22. </a:t>
+            </a:r>
+            <a:r>
+              <a:rPr lang="ko-KR" sz="1800">
+                <a:latin typeface="맑은 고딕" charset="0"/>
+                <a:ea typeface="맑은 고딕" charset="0"/>
+              </a:rPr>
+              <a:t>그리고 애니메이션을 선택한 다음 애니메이션 클립 이름을 각각의 애니메이션 이름으로 변경합니다. </a:t>
+            </a:r>
             <a:endParaRPr lang="ko-KR" altLang="en-US" sz="1800">
               <a:latin typeface="맑은 고딕" charset="0"/>
               <a:ea typeface="맑은 고딕" charset="0"/>
@@ -9768,14 +9764,14 @@
       </p:sp>
       <p:pic>
         <p:nvPicPr>
-          <p:cNvPr id="1184" name="그림 200"/>
+          <p:cNvPr id="1190" name="그림 20" descr="C:/Users/Admin1/AppData/Roaming/PolarisOffice/ETemp/9880_20815312/fImage185935541.png"/>
           <p:cNvPicPr>
             <a:picLocks noChangeAspect="1"/>
           </p:cNvPicPr>
           <p:nvPr/>
         </p:nvPicPr>
         <p:blipFill rotWithShape="1">
-          <a:blip r:embed="rId9" cstate="print">
+          <a:blip r:embed="rId14" cstate="print">
             <a:extLst>
               <a:ext uri="{28A0092B-C50C-407E-A947-70E740481C1C}">
                 <a14:useLocalDpi xmlns:a14="http://schemas.microsoft.com/office/drawing/2010/main" val="0"/>
@@ -9788,8 +9784,8 @@
         </p:blipFill>
         <p:spPr>
           <a:xfrm rot="0">
-            <a:off x="1181100" y="4406900"/>
-            <a:ext cx="843280" cy="626745"/>
+            <a:off x="1162050" y="4476750"/>
+            <a:ext cx="4182110" cy="648335"/>
           </a:xfrm>
           <a:prstGeom prst="roundRect"/>
           <a:solidFill>
@@ -9799,14 +9795,14 @@
       </p:pic>
       <p:pic>
         <p:nvPicPr>
-          <p:cNvPr id="1185" name="그림 201"/>
+          <p:cNvPr id="1191" name="그림 23" descr="C:/Users/Admin1/AppData/Roaming/PolarisOffice/ETemp/9880_20815312/fImage18583568467.png"/>
           <p:cNvPicPr>
             <a:picLocks noChangeAspect="1"/>
           </p:cNvPicPr>
           <p:nvPr/>
         </p:nvPicPr>
         <p:blipFill rotWithShape="1">
-          <a:blip r:embed="rId10" cstate="print">
+          <a:blip r:embed="rId15" cstate="print">
             <a:extLst>
               <a:ext uri="{28A0092B-C50C-407E-A947-70E740481C1C}">
                 <a14:useLocalDpi xmlns:a14="http://schemas.microsoft.com/office/drawing/2010/main" val="0"/>
@@ -9819,8 +9815,8 @@
         </p:blipFill>
         <p:spPr>
           <a:xfrm rot="0">
-            <a:off x="1183640" y="3486150"/>
-            <a:ext cx="841375" cy="673735"/>
+            <a:off x="1181100" y="3590925"/>
+            <a:ext cx="4163060" cy="657860"/>
           </a:xfrm>
           <a:prstGeom prst="roundRect"/>
           <a:solidFill>
@@ -9828,118 +9824,6 @@
           </a:solidFill>
         </p:spPr>
       </p:pic>
-      <p:pic>
-        <p:nvPicPr>
-          <p:cNvPr id="1186" name="그림 202"/>
-          <p:cNvPicPr>
-            <a:picLocks noChangeAspect="1"/>
-          </p:cNvPicPr>
-          <p:nvPr/>
-        </p:nvPicPr>
-        <p:blipFill rotWithShape="1">
-          <a:blip r:embed="rId11" cstate="print">
-            <a:extLst>
-              <a:ext uri="{28A0092B-C50C-407E-A947-70E740481C1C}">
-                <a14:useLocalDpi xmlns:a14="http://schemas.microsoft.com/office/drawing/2010/main" val="0"/>
-              </a:ext>
-            </a:extLst>
-          </a:blip>
-          <a:stretch>
-            <a:fillRect/>
-          </a:stretch>
-        </p:blipFill>
-        <p:spPr>
-          <a:xfrm rot="0">
-            <a:off x="3769995" y="3469005"/>
-            <a:ext cx="1572260" cy="1572260"/>
-          </a:xfrm>
-          <a:prstGeom prst="rect"/>
-          <a:noFill/>
-        </p:spPr>
-      </p:pic>
-      <p:pic>
-        <p:nvPicPr>
-          <p:cNvPr id="1187" name="그림 203"/>
-          <p:cNvPicPr>
-            <a:picLocks noChangeAspect="1"/>
-          </p:cNvPicPr>
-          <p:nvPr/>
-        </p:nvPicPr>
-        <p:blipFill rotWithShape="1">
-          <a:blip r:embed="rId12" cstate="print">
-            <a:extLst>
-              <a:ext uri="{28A0092B-C50C-407E-A947-70E740481C1C}">
-                <a14:useLocalDpi xmlns:a14="http://schemas.microsoft.com/office/drawing/2010/main" val="0"/>
-              </a:ext>
-            </a:extLst>
-          </a:blip>
-          <a:stretch>
-            <a:fillRect/>
-          </a:stretch>
-        </p:blipFill>
-        <p:spPr>
-          <a:xfrm rot="0">
-            <a:off x="2134870" y="3476625"/>
-            <a:ext cx="1517015" cy="1564640"/>
-          </a:xfrm>
-          <a:prstGeom prst="rect"/>
-          <a:noFill/>
-        </p:spPr>
-      </p:pic>
-      <p:sp>
-        <p:nvSpPr>
-          <p:cNvPr id="1188" name="텍스트 상자 204"/>
-          <p:cNvSpPr txBox="1">
-            <a:spLocks/>
-          </p:cNvSpPr>
-          <p:nvPr/>
-        </p:nvSpPr>
-        <p:spPr>
-          <a:xfrm rot="0">
-            <a:off x="1184275" y="5262880"/>
-            <a:ext cx="4159885" cy="954405"/>
-          </a:xfrm>
-          <a:prstGeom prst="rect"/>
-          <a:noFill/>
-          <a:ln w="0">
-            <a:noFill/>
-            <a:prstDash/>
-          </a:ln>
-        </p:spPr>
-        <p:txBody>
-          <a:bodyPr wrap="square" lIns="89535" tIns="46355" rIns="89535" bIns="46355" numCol="1" vert="horz" anchor="t">
-            <a:spAutoFit/>
-          </a:bodyPr>
-          <a:lstStyle/>
-          <a:p>
-            <a:pPr marL="0" indent="0" algn="l" latinLnBrk="0" hangingPunct="1">
-              <a:buFontTx/>
-              <a:buNone/>
-            </a:pPr>
-            <a:r>
-              <a:rPr lang="ko-KR" sz="2000" b="1">
-                <a:solidFill>
-                  <a:srgbClr val="0611F2"/>
-                </a:solidFill>
-                <a:latin typeface="맑은 고딕" charset="0"/>
-                <a:ea typeface="맑은 고딕" charset="0"/>
-              </a:rPr>
-              <a:t>22. </a:t>
-            </a:r>
-            <a:r>
-              <a:rPr lang="ko-KR" sz="1800">
-                <a:latin typeface="맑은 고딕" charset="0"/>
-                <a:ea typeface="맑은 고딕" charset="0"/>
-              </a:rPr>
-              <a:t>그리고 애니메이션을 선택한 다음 애니메이션 클립 이름을 각각의 애니메이션 이름으로 변경합니다. </a:t>
-            </a:r>
-            <a:endParaRPr lang="ko-KR" altLang="en-US" sz="1800">
-              <a:latin typeface="맑은 고딕" charset="0"/>
-              <a:ea typeface="맑은 고딕" charset="0"/>
-            </a:endParaRPr>
-          </a:p>
-        </p:txBody>
-      </p:sp>
     </p:spTree>
   </p:cSld>
   <p:clrMapOvr>
@@ -10040,8 +9924,8 @@
         </p:nvSpPr>
         <p:spPr>
           <a:xfrm rot="0">
-            <a:off x="6835775" y="4281170"/>
-            <a:ext cx="4347210" cy="1784985"/>
+            <a:off x="6844665" y="4220845"/>
+            <a:ext cx="4183380" cy="2061845"/>
           </a:xfrm>
           <a:prstGeom prst="rect"/>
           <a:noFill/>
@@ -10113,7 +9997,7 @@
       </p:sp>
       <p:pic>
         <p:nvPicPr>
-          <p:cNvPr id="1165" name="Picture " descr="C:/Users/Admin1/AppData/Roaming/PolarisOffice/ETemp/21372_12698968/fImage45714593811.png"/>
+          <p:cNvPr id="1165" name="Picture " descr="C:/Users/Admin1/AppData/Roaming/PolarisOffice/ETemp/9880_20815312/fImage45714593811.png"/>
           <p:cNvPicPr>
             <a:picLocks noChangeAspect="1"/>
           </p:cNvPicPr>
@@ -10134,17 +10018,15 @@
         <p:spPr>
           <a:xfrm rot="0">
             <a:off x="6838950" y="1485900"/>
-            <a:ext cx="4344035" cy="2610485"/>
-          </a:xfrm>
-          <a:prstGeom prst="roundRect"/>
-          <a:solidFill>
-            <a:srgbClr val="EDEDED"/>
-          </a:solidFill>
+            <a:ext cx="4180205" cy="2631440"/>
+          </a:xfrm>
+          <a:prstGeom prst="rect"/>
+          <a:noFill/>
         </p:spPr>
       </p:pic>
       <p:pic>
         <p:nvPicPr>
-          <p:cNvPr id="1168" name="그림 205" descr="C:/Users/Admin1/AppData/Roaming/PolarisOffice/ETemp/21372_12698968/fImage16105485333.png"/>
+          <p:cNvPr id="1168" name="그림 205" descr="C:/Users/Admin1/AppData/Roaming/PolarisOffice/ETemp/9880_20815312/fImage16105485333.png"/>
           <p:cNvPicPr>
             <a:picLocks noChangeAspect="1"/>
           </p:cNvPicPr>
@@ -10165,7 +10047,7 @@
         <p:spPr>
           <a:xfrm rot="0">
             <a:off x="1123950" y="1476375"/>
-            <a:ext cx="4249420" cy="2458085"/>
+            <a:ext cx="4250055" cy="2640965"/>
           </a:xfrm>
           <a:prstGeom prst="roundRect"/>
           <a:solidFill>
@@ -10183,8 +10065,8 @@
         </p:nvSpPr>
         <p:spPr>
           <a:xfrm rot="0">
-            <a:off x="1125855" y="4000500"/>
-            <a:ext cx="4247515" cy="2062480"/>
+            <a:off x="1125855" y="4225290"/>
+            <a:ext cx="4248150" cy="2063115"/>
           </a:xfrm>
           <a:prstGeom prst="rect"/>
           <a:noFill/>
@@ -10679,8 +10561,8 @@
         </p:nvSpPr>
         <p:spPr>
           <a:xfrm rot="0">
-            <a:off x="1216025" y="4970145"/>
-            <a:ext cx="4166235" cy="954405"/>
+            <a:off x="6815455" y="4755515"/>
+            <a:ext cx="3996055" cy="1231265"/>
           </a:xfrm>
           <a:prstGeom prst="rect"/>
           <a:noFill/>
@@ -10775,7 +10657,7 @@
       </p:sp>
       <p:pic>
         <p:nvPicPr>
-          <p:cNvPr id="1134" name="그림 217" descr="C:/Users/Admin1/AppData/Roaming/PolarisOffice/ETemp/21372_12698968/fImage191385015141.png"/>
+          <p:cNvPr id="1134" name="그림 217" descr="C:/Users/Admin1/AppData/Roaming/PolarisOffice/ETemp/9880_20815312/fImage191385015141.png"/>
           <p:cNvPicPr>
             <a:picLocks noChangeAspect="1"/>
           </p:cNvPicPr>
@@ -10795,8 +10677,8 @@
         </p:blipFill>
         <p:spPr>
           <a:xfrm rot="0">
-            <a:off x="1219200" y="1438275"/>
-            <a:ext cx="2724785" cy="3391535"/>
+            <a:off x="6823710" y="1490345"/>
+            <a:ext cx="2734310" cy="3129915"/>
           </a:xfrm>
           <a:prstGeom prst="roundRect"/>
           <a:solidFill>
@@ -10806,7 +10688,7 @@
       </p:pic>
       <p:pic>
         <p:nvPicPr>
-          <p:cNvPr id="1135" name="그림 218" descr="C:/Users/Admin1/AppData/Roaming/PolarisOffice/ETemp/21372_12698968/fImage77175027711.png"/>
+          <p:cNvPr id="1135" name="그림 218" descr="C:/Users/Admin1/AppData/Roaming/PolarisOffice/ETemp/9880_20815312/fImage77175027711.png"/>
           <p:cNvPicPr>
             <a:picLocks noChangeAspect="1"/>
           </p:cNvPicPr>
@@ -10826,8 +10708,8 @@
         </p:blipFill>
         <p:spPr>
           <a:xfrm rot="0">
-            <a:off x="4157345" y="2171700"/>
-            <a:ext cx="1224915" cy="2038985"/>
+            <a:off x="9667875" y="2033270"/>
+            <a:ext cx="1143635" cy="2039620"/>
           </a:xfrm>
           <a:prstGeom prst="roundRect"/>
           <a:solidFill>
@@ -10835,150 +10717,6 @@
           </a:solidFill>
         </p:spPr>
       </p:pic>
-      <p:pic>
-        <p:nvPicPr>
-          <p:cNvPr id="1136" name="그림 49" descr="C:/Users/Admin1/AppData/Roaming/PolarisOffice/ETemp/21372_12698968/fImage123044601478.png"/>
-          <p:cNvPicPr>
-            <a:picLocks noChangeAspect="1"/>
-          </p:cNvPicPr>
-          <p:nvPr/>
-        </p:nvPicPr>
-        <p:blipFill rotWithShape="1">
-          <a:blip r:embed="rId7" cstate="print">
-            <a:extLst>
-              <a:ext uri="{28A0092B-C50C-407E-A947-70E740481C1C}">
-                <a14:useLocalDpi xmlns:a14="http://schemas.microsoft.com/office/drawing/2010/main" val="0"/>
-              </a:ext>
-            </a:extLst>
-          </a:blip>
-          <a:stretch>
-            <a:fillRect/>
-          </a:stretch>
-        </p:blipFill>
-        <p:spPr>
-          <a:xfrm rot="0">
-            <a:off x="6810375" y="1438275"/>
-            <a:ext cx="4086860" cy="1753235"/>
-          </a:xfrm>
-          <a:prstGeom prst="roundRect"/>
-          <a:solidFill>
-            <a:srgbClr val="EDEDED"/>
-          </a:solidFill>
-        </p:spPr>
-      </p:pic>
-      <p:pic>
-        <p:nvPicPr>
-          <p:cNvPr id="1137" name="그림 52" descr="C:/Users/Admin1/AppData/Roaming/PolarisOffice/ETemp/21372_12698968/fImage125814619358.png"/>
-          <p:cNvPicPr>
-            <a:picLocks noChangeAspect="1"/>
-          </p:cNvPicPr>
-          <p:nvPr/>
-        </p:nvPicPr>
-        <p:blipFill rotWithShape="1">
-          <a:blip r:embed="rId8" cstate="print">
-            <a:extLst>
-              <a:ext uri="{28A0092B-C50C-407E-A947-70E740481C1C}">
-                <a14:useLocalDpi xmlns:a14="http://schemas.microsoft.com/office/drawing/2010/main" val="0"/>
-              </a:ext>
-            </a:extLst>
-          </a:blip>
-          <a:stretch>
-            <a:fillRect/>
-          </a:stretch>
-        </p:blipFill>
-        <p:spPr>
-          <a:xfrm rot="0">
-            <a:off x="6819900" y="3409950"/>
-            <a:ext cx="4086860" cy="1753235"/>
-          </a:xfrm>
-          <a:prstGeom prst="roundRect"/>
-          <a:solidFill>
-            <a:srgbClr val="EDEDED"/>
-          </a:solidFill>
-        </p:spPr>
-      </p:pic>
-      <p:sp>
-        <p:nvSpPr>
-          <p:cNvPr id="1138" name="텍스트 상자 56"/>
-          <p:cNvSpPr txBox="1">
-            <a:spLocks/>
-          </p:cNvSpPr>
-          <p:nvPr/>
-        </p:nvSpPr>
-        <p:spPr>
-          <a:xfrm rot="0">
-            <a:off x="6810375" y="5243830"/>
-            <a:ext cx="4105910" cy="677545"/>
-          </a:xfrm>
-          <a:prstGeom prst="rect"/>
-          <a:noFill/>
-          <a:ln w="0">
-            <a:noFill/>
-            <a:prstDash/>
-          </a:ln>
-        </p:spPr>
-        <p:txBody>
-          <a:bodyPr wrap="square" lIns="89535" tIns="46355" rIns="89535" bIns="46355" numCol="1" vert="horz" anchor="t">
-            <a:spAutoFit/>
-          </a:bodyPr>
-          <a:lstStyle/>
-          <a:p>
-            <a:pPr marL="0" indent="0" algn="l" latinLnBrk="0" hangingPunct="1">
-              <a:buFontTx/>
-              <a:buNone/>
-            </a:pPr>
-            <a:r>
-              <a:rPr lang="ko-KR" sz="2000" b="1">
-                <a:solidFill>
-                  <a:srgbClr val="0611F2"/>
-                </a:solidFill>
-                <a:latin typeface="맑은 고딕" charset="0"/>
-                <a:ea typeface="맑은 고딕" charset="0"/>
-              </a:rPr>
-              <a:t>28. </a:t>
-            </a:r>
-            <a:r>
-              <a:rPr lang="ko-KR" sz="1800">
-                <a:latin typeface="맑은 고딕" charset="0"/>
-                <a:ea typeface="맑은 고딕" charset="0"/>
-              </a:rPr>
-              <a:t>그리고 </a:t>
-            </a:r>
-            <a:r>
-              <a:rPr lang="ko-KR" sz="1800">
-                <a:latin typeface="맑은 고딕" charset="0"/>
-                <a:ea typeface="맑은 고딕" charset="0"/>
-              </a:rPr>
-              <a:t>Kick Button과 Running Button의</a:t>
-            </a:r>
-            <a:r>
-              <a:rPr lang="ko-KR" sz="1800">
-                <a:latin typeface="맑은 고딕" charset="0"/>
-                <a:ea typeface="맑은 고딕" charset="0"/>
-              </a:rPr>
-              <a:t> 앵커</a:t>
-            </a:r>
-            <a:r>
-              <a:rPr lang="ko-KR" sz="1800">
-                <a:latin typeface="맑은 고딕" charset="0"/>
-                <a:ea typeface="맑은 고딕" charset="0"/>
-              </a:rPr>
-              <a:t>와</a:t>
-            </a:r>
-            <a:r>
-              <a:rPr lang="ko-KR" sz="1800">
-                <a:latin typeface="맑은 고딕" charset="0"/>
-                <a:ea typeface="맑은 고딕" charset="0"/>
-              </a:rPr>
-              <a:t> 위치를 설정합니다.</a:t>
-            </a:r>
-            <a:endParaRPr lang="ko-KR" altLang="en-US" sz="1800">
-              <a:latin typeface="맑은 고딕" charset="0"/>
-              <a:ea typeface="맑은 고딕" charset="0"/>
-            </a:endParaRPr>
-          </a:p>
-        </p:txBody>
-      </p:sp>
     </p:spTree>
   </p:cSld>
   <p:clrMapOvr>
@@ -11029,8 +10767,8 @@
         </p:nvSpPr>
         <p:spPr>
           <a:xfrm rot="0">
-            <a:off x="6934200" y="3855720"/>
-            <a:ext cx="4301490" cy="1784985"/>
+            <a:off x="6951980" y="4037330"/>
+            <a:ext cx="4128135" cy="2061845"/>
           </a:xfrm>
           <a:prstGeom prst="rect"/>
           <a:noFill/>
@@ -11064,7 +10802,21 @@
                 <a:latin typeface="맑은 고딕" charset="0"/>
                 <a:ea typeface="맑은 고딕" charset="0"/>
               </a:rPr>
-              <a:t>여기서 각각의 버튼 이벤트 함수에 AnimationAction 오브젝트를 넣어줍니다.</a:t>
+              <a:t>여기서 </a:t>
+            </a:r>
+            <a:r>
+              <a:rPr lang="ko-KR" sz="1800">
+                <a:latin typeface="맑은 고딕" charset="0"/>
+                <a:ea typeface="맑은 고딕" charset="0"/>
+              </a:rPr>
+              <a:t>kick Button과 Running Button의</a:t>
+            </a:r>
+            <a:r>
+              <a:rPr lang="ko-KR" sz="1800">
+                <a:latin typeface="맑은 고딕" charset="0"/>
+                <a:ea typeface="맑은 고딕" charset="0"/>
+              </a:rPr>
+              <a:t> 이벤트 함수에 AnimationAction 오브젝트를 넣어줍니다.</a:t>
             </a:r>
             <a:endParaRPr lang="ko-KR" altLang="en-US" sz="1800">
               <a:latin typeface="맑은 고딕" charset="0"/>
@@ -11152,17 +10904,17 @@
       </p:sp>
       <p:pic>
         <p:nvPicPr>
-          <p:cNvPr id="1138" name="그림 223"/>
+          <p:cNvPr id="1138" name="그림 223" descr="C:/Users/Admin1/AppData/Roaming/PolarisOffice/ETemp/9880_20815312/fImage51935165547.png"/>
           <p:cNvPicPr>
             <a:picLocks noChangeAspect="1"/>
           </p:cNvPicPr>
           <p:nvPr/>
         </p:nvPicPr>
         <p:blipFill rotWithShape="1">
-          <a:blip r:embed="rId4" cstate="print">
+          <a:blip r:embed="rId4" cstate="hqprint">
             <a:extLst>
               <a:ext uri="{28A0092B-C50C-407E-A947-70E740481C1C}">
-                <a14:useLocalDpi xmlns:a14="http://schemas.microsoft.com/office/drawing/2010/main" val="0"/>
+                <a14:useLocalDpi xmlns:a14="http://schemas.microsoft.com/office/drawing/2010/main"/>
               </a:ext>
             </a:extLst>
           </a:blip>
@@ -11172,26 +10924,28 @@
         </p:blipFill>
         <p:spPr>
           <a:xfrm rot="0">
-            <a:off x="8448675" y="2614295"/>
-            <a:ext cx="2791460" cy="1057910"/>
-          </a:xfrm>
-          <a:prstGeom prst="rect"/>
-          <a:noFill/>
+            <a:off x="6944995" y="2767965"/>
+            <a:ext cx="4135120" cy="1056005"/>
+          </a:xfrm>
+          <a:prstGeom prst="roundRect"/>
+          <a:solidFill>
+            <a:srgbClr val="EDEDED"/>
+          </a:solidFill>
         </p:spPr>
       </p:pic>
       <p:pic>
         <p:nvPicPr>
-          <p:cNvPr id="1139" name="그림 224"/>
+          <p:cNvPr id="1139" name="그림 224" descr="C:/Users/Admin1/AppData/Roaming/PolarisOffice/ETemp/9880_20815312/fImage51055177644.png"/>
           <p:cNvPicPr>
             <a:picLocks noChangeAspect="1"/>
           </p:cNvPicPr>
           <p:nvPr/>
         </p:nvPicPr>
         <p:blipFill rotWithShape="1">
-          <a:blip r:embed="rId5" cstate="print">
+          <a:blip r:embed="rId5" cstate="hqprint">
             <a:extLst>
               <a:ext uri="{28A0092B-C50C-407E-A947-70E740481C1C}">
-                <a14:useLocalDpi xmlns:a14="http://schemas.microsoft.com/office/drawing/2010/main" val="0"/>
+                <a14:useLocalDpi xmlns:a14="http://schemas.microsoft.com/office/drawing/2010/main"/>
               </a:ext>
             </a:extLst>
           </a:blip>
@@ -11201,26 +10955,28 @@
         </p:blipFill>
         <p:spPr>
           <a:xfrm rot="0">
-            <a:off x="8458200" y="1452245"/>
-            <a:ext cx="2772410" cy="1000760"/>
-          </a:xfrm>
-          <a:prstGeom prst="rect"/>
-          <a:noFill/>
+            <a:off x="6944995" y="1452880"/>
+            <a:ext cx="4143375" cy="1056005"/>
+          </a:xfrm>
+          <a:prstGeom prst="roundRect"/>
+          <a:solidFill>
+            <a:srgbClr val="EDEDED"/>
+          </a:solidFill>
         </p:spPr>
       </p:pic>
       <p:pic>
         <p:nvPicPr>
-          <p:cNvPr id="1140" name="그림 225"/>
+          <p:cNvPr id="1141" name="그림 9" descr="C:/Users/Admin1/AppData/Roaming/PolarisOffice/ETemp/9880_20815312/fImage123044601478.png"/>
           <p:cNvPicPr>
             <a:picLocks noChangeAspect="1"/>
           </p:cNvPicPr>
           <p:nvPr/>
         </p:nvPicPr>
         <p:blipFill rotWithShape="1">
-          <a:blip r:embed="rId6" cstate="print">
+          <a:blip r:embed="rId8" cstate="hqprint">
             <a:extLst>
               <a:ext uri="{28A0092B-C50C-407E-A947-70E740481C1C}">
-                <a14:useLocalDpi xmlns:a14="http://schemas.microsoft.com/office/drawing/2010/main" val="0"/>
+                <a14:useLocalDpi xmlns:a14="http://schemas.microsoft.com/office/drawing/2010/main"/>
               </a:ext>
             </a:extLst>
           </a:blip>
@@ -11230,8 +10986,8 @@
         </p:blipFill>
         <p:spPr>
           <a:xfrm rot="0">
-            <a:off x="6934200" y="1876425"/>
-            <a:ext cx="1286510" cy="1305560"/>
+            <a:off x="1335405" y="1455420"/>
+            <a:ext cx="4062095" cy="1753870"/>
           </a:xfrm>
           <a:prstGeom prst="roundRect"/>
           <a:solidFill>
@@ -11239,6 +10995,91 @@
           </a:solidFill>
         </p:spPr>
       </p:pic>
+      <p:pic>
+        <p:nvPicPr>
+          <p:cNvPr id="1142" name="그림 10" descr="C:/Users/Admin1/AppData/Roaming/PolarisOffice/ETemp/9880_20815312/fImage125814619358.png"/>
+          <p:cNvPicPr>
+            <a:picLocks noChangeAspect="1"/>
+          </p:cNvPicPr>
+          <p:nvPr/>
+        </p:nvPicPr>
+        <p:blipFill rotWithShape="1">
+          <a:blip r:embed="rId9" cstate="hqprint">
+            <a:extLst>
+              <a:ext uri="{28A0092B-C50C-407E-A947-70E740481C1C}">
+                <a14:useLocalDpi xmlns:a14="http://schemas.microsoft.com/office/drawing/2010/main"/>
+              </a:ext>
+            </a:extLst>
+          </a:blip>
+          <a:stretch>
+            <a:fillRect/>
+          </a:stretch>
+        </p:blipFill>
+        <p:spPr>
+          <a:xfrm rot="0">
+            <a:off x="1344930" y="3427095"/>
+            <a:ext cx="4062095" cy="1753870"/>
+          </a:xfrm>
+          <a:prstGeom prst="roundRect"/>
+          <a:solidFill>
+            <a:srgbClr val="EDEDED"/>
+          </a:solidFill>
+        </p:spPr>
+      </p:pic>
+      <p:sp>
+        <p:nvSpPr>
+          <p:cNvPr id="1143" name="텍스트 상자 11"/>
+          <p:cNvSpPr txBox="1">
+            <a:spLocks/>
+          </p:cNvSpPr>
+          <p:nvPr/>
+        </p:nvSpPr>
+        <p:spPr>
+          <a:xfrm rot="0">
+            <a:off x="1335405" y="5416550"/>
+            <a:ext cx="4080510" cy="677545"/>
+          </a:xfrm>
+          <a:prstGeom prst="rect"/>
+          <a:noFill/>
+          <a:ln w="0">
+            <a:noFill/>
+            <a:prstDash/>
+          </a:ln>
+        </p:spPr>
+        <p:txBody>
+          <a:bodyPr wrap="square" lIns="89535" tIns="46355" rIns="89535" bIns="46355" numCol="1" vert="horz" anchor="t">
+            <a:spAutoFit/>
+          </a:bodyPr>
+          <a:lstStyle/>
+          <a:p>
+            <a:pPr marL="0" indent="0" algn="l" latinLnBrk="0" hangingPunct="1">
+              <a:buFontTx/>
+              <a:buNone/>
+            </a:pPr>
+            <a:r>
+              <a:rPr lang="ko-KR" sz="2000" b="1">
+                <a:solidFill>
+                  <a:srgbClr val="0611F2"/>
+                </a:solidFill>
+                <a:latin typeface="맑은 고딕" charset="0"/>
+                <a:ea typeface="맑은 고딕" charset="0"/>
+              </a:rPr>
+              <a:t>28. </a:t>
+            </a:r>
+            <a:r>
+              <a:rPr lang="ko-KR" sz="1800">
+                <a:latin typeface="맑은 고딕" charset="0"/>
+                <a:ea typeface="맑은 고딕" charset="0"/>
+              </a:rPr>
+              <a:t>그리고 Kick Button과 Running Button의 앵커와 위치를 설정합니다.</a:t>
+            </a:r>
+            <a:endParaRPr lang="ko-KR" altLang="en-US" sz="1800">
+              <a:latin typeface="맑은 고딕" charset="0"/>
+              <a:ea typeface="맑은 고딕" charset="0"/>
+            </a:endParaRPr>
+          </a:p>
+        </p:txBody>
+      </p:sp>
     </p:spTree>
   </p:cSld>
   <p:clrMapOvr>
@@ -17164,7 +17005,7 @@
       </p:sp>
       <p:pic>
         <p:nvPicPr>
-          <p:cNvPr id="1160" name="그림 99" descr="C:/Users/Admin1/AppData/Roaming/PolarisOffice/ETemp/21372_12698968/fImage29523219961.png"/>
+          <p:cNvPr id="1160" name="그림 99"/>
           <p:cNvPicPr>
             <a:picLocks noChangeAspect="1"/>
           </p:cNvPicPr>
@@ -17230,7 +17071,7 @@
       </p:cxnSp>
       <p:pic>
         <p:nvPicPr>
-          <p:cNvPr id="1167" name="그림 28" descr="C:/Users/Admin1/AppData/Roaming/PolarisOffice/ETemp/21372_12698968/fImage50043163281.png"/>
+          <p:cNvPr id="1167" name="그림 28"/>
           <p:cNvPicPr>
             <a:picLocks noChangeAspect="1"/>
           </p:cNvPicPr>
@@ -17261,7 +17102,7 @@
       </p:pic>
       <p:pic>
         <p:nvPicPr>
-          <p:cNvPr id="1168" name="그림 29" descr="C:/Users/Admin1/AppData/Roaming/PolarisOffice/ETemp/21372_12698968/fImage85063176827.png"/>
+          <p:cNvPr id="1168" name="그림 29"/>
           <p:cNvPicPr>
             <a:picLocks noChangeAspect="1"/>
           </p:cNvPicPr>
@@ -17468,7 +17309,7 @@
       </p:sp>
       <p:pic>
         <p:nvPicPr>
-          <p:cNvPr id="1171" name="그림 15" descr="C:/Users/Admin1/AppData/Roaming/PolarisOffice/ETemp/21372_12698968/fImage3349343452995.png"/>
+          <p:cNvPr id="1171" name="그림 15" descr="C:/Users/Admin1/AppData/Roaming/PolarisOffice/ETemp/9880_20815312/fImage3349343452995.png"/>
           <p:cNvPicPr>
             <a:picLocks noChangeAspect="1"/>
           </p:cNvPicPr>
@@ -17489,7 +17330,7 @@
         <p:spPr>
           <a:xfrm rot="0">
             <a:off x="6823710" y="1471930"/>
-            <a:ext cx="4168140" cy="3547110"/>
+            <a:ext cx="4168775" cy="3547745"/>
           </a:xfrm>
           <a:prstGeom prst="rect"/>
           <a:noFill/>
@@ -17595,8 +17436,8 @@
         </p:nvSpPr>
         <p:spPr>
           <a:xfrm rot="0">
-            <a:off x="1323975" y="4460240"/>
-            <a:ext cx="4010660" cy="1508125"/>
+            <a:off x="1323975" y="4477385"/>
+            <a:ext cx="4011295" cy="1508760"/>
           </a:xfrm>
           <a:prstGeom prst="rect"/>
           <a:noFill/>
@@ -17668,7 +17509,7 @@
       </p:sp>
       <p:pic>
         <p:nvPicPr>
-          <p:cNvPr id="1166" name="그림 108" descr="C:/Users/Admin1/AppData/Roaming/PolarisOffice/ETemp/21372_12698968/fImage113473461942.png"/>
+          <p:cNvPr id="1166" name="그림 108"/>
           <p:cNvPicPr>
             <a:picLocks noChangeAspect="1"/>
           </p:cNvPicPr>
@@ -17699,7 +17540,7 @@
       </p:pic>
       <p:pic>
         <p:nvPicPr>
-          <p:cNvPr id="1167" name="그림 109" descr="C:/Users/Admin1/AppData/Roaming/PolarisOffice/ETemp/21372_12698968/fImage115223474827.png"/>
+          <p:cNvPr id="1167" name="그림 109"/>
           <p:cNvPicPr>
             <a:picLocks noChangeAspect="1"/>
           </p:cNvPicPr>
@@ -17784,7 +17625,7 @@
       </p:sp>
       <p:pic>
         <p:nvPicPr>
-          <p:cNvPr id="1174" name="그림 18" descr="C:/Users/Admin1/AppData/Roaming/PolarisOffice/ETemp/21372_12698968/fImage61383636334.png"/>
+          <p:cNvPr id="1174" name="그림 18"/>
           <p:cNvPicPr>
             <a:picLocks noChangeAspect="1"/>
           </p:cNvPicPr>
@@ -17815,7 +17656,7 @@
       </p:pic>
       <p:pic>
         <p:nvPicPr>
-          <p:cNvPr id="1175" name="그림 22" descr="C:/Users/Admin1/AppData/Roaming/PolarisOffice/ETemp/21372_12698968/fImage1989133656500.png"/>
+          <p:cNvPr id="1175" name="그림 22"/>
           <p:cNvPicPr>
             <a:picLocks noChangeAspect="1"/>
           </p:cNvPicPr>
@@ -17844,7 +17685,7 @@
       </p:pic>
       <p:pic>
         <p:nvPicPr>
-          <p:cNvPr id="1176" name="그림 23" descr="C:/Users/Admin1/AppData/Roaming/PolarisOffice/ETemp/21372_12698968/fImage10263376153.png"/>
+          <p:cNvPr id="1176" name="그림 23"/>
           <p:cNvPicPr>
             <a:picLocks noChangeAspect="1"/>
           </p:cNvPicPr>
@@ -17883,8 +17724,8 @@
         </p:nvSpPr>
         <p:spPr>
           <a:xfrm rot="0">
-            <a:off x="6806565" y="5292090"/>
-            <a:ext cx="4199890" cy="677545"/>
+            <a:off x="6806565" y="5309235"/>
+            <a:ext cx="4200525" cy="678180"/>
           </a:xfrm>
           <a:prstGeom prst="rect"/>
           <a:noFill/>
@@ -17918,14 +17759,7 @@
                 <a:latin typeface="맑은 고딕" charset="0"/>
                 <a:ea typeface="맑은 고딕" charset="0"/>
               </a:rPr>
-              <a:t>이제</a:t>
-            </a:r>
-            <a:r>
-              <a:rPr lang="ko-KR" sz="1800">
-                <a:latin typeface="맑은 고딕" charset="0"/>
-                <a:ea typeface="맑은 고딕" charset="0"/>
-              </a:rPr>
-              <a:t> 애니메이터 컨트롤러를 선택하여 Base Layer에 들어옵니다. </a:t>
+              <a:t>이제 애니메이터 컨트롤러를 선택하여 Base Layer에 들어옵니다. </a:t>
             </a:r>
             <a:endParaRPr lang="ko-KR" altLang="en-US" sz="1800">
               <a:latin typeface="맑은 고딕" charset="0"/>
@@ -18938,7 +18772,7 @@
         <p:spPr>
           <a:xfrm rot="0">
             <a:off x="6837045" y="4319905"/>
-            <a:ext cx="4150995" cy="1785620"/>
+            <a:ext cx="4363720" cy="1784985"/>
           </a:xfrm>
           <a:prstGeom prst="rect"/>
           <a:noFill/>
@@ -19010,7 +18844,7 @@
       </p:sp>
       <p:pic>
         <p:nvPicPr>
-          <p:cNvPr id="1168" name="그림 162" descr="C:/Users/Admin1/AppData/Roaming/PolarisOffice/ETemp/21372_12698968/fImage2468734327421.png"/>
+          <p:cNvPr id="1168" name="그림 162"/>
           <p:cNvPicPr>
             <a:picLocks noChangeAspect="1"/>
           </p:cNvPicPr>
@@ -19041,7 +18875,7 @@
       </p:pic>
       <p:pic>
         <p:nvPicPr>
-          <p:cNvPr id="1169" name="그림 163" descr="C:/Users/Admin1/AppData/Roaming/PolarisOffice/ETemp/21372_12698968/fImage2366184338716.png"/>
+          <p:cNvPr id="1169" name="그림 163"/>
           <p:cNvPicPr>
             <a:picLocks noChangeAspect="1"/>
           </p:cNvPicPr>
@@ -19126,7 +18960,7 @@
       </p:sp>
       <p:pic>
         <p:nvPicPr>
-          <p:cNvPr id="1172" name="그림 170" descr="C:/Users/Admin1/AppData/Roaming/PolarisOffice/ETemp/21372_12698968/fImage1290804479718.png"/>
+          <p:cNvPr id="1172" name="그림 170" descr="C:/Users/Admin1/AppData/Roaming/PolarisOffice/ETemp/9880_20815312/fImage1290804479718.png"/>
           <p:cNvPicPr>
             <a:picLocks noChangeAspect="1"/>
           </p:cNvPicPr>
@@ -19147,7 +18981,7 @@
         <p:spPr>
           <a:xfrm rot="0">
             <a:off x="6817995" y="1409065"/>
-            <a:ext cx="1962150" cy="2773045"/>
+            <a:ext cx="2099310" cy="2773680"/>
           </a:xfrm>
           <a:prstGeom prst="rect"/>
           <a:noFill/>
@@ -19155,7 +18989,7 @@
       </p:pic>
       <p:pic>
         <p:nvPicPr>
-          <p:cNvPr id="1173" name="그림 172" descr="C:/Users/Admin1/AppData/Roaming/PolarisOffice/ETemp/21372_12698968/fImage1268824489895.png"/>
+          <p:cNvPr id="1173" name="그림 172" descr="C:/Users/Admin1/AppData/Roaming/PolarisOffice/ETemp/9880_20815312/fImage1268824489895.png"/>
           <p:cNvPicPr>
             <a:picLocks noChangeAspect="1"/>
           </p:cNvPicPr>
@@ -19175,8 +19009,8 @@
         </p:blipFill>
         <p:spPr>
           <a:xfrm rot="0">
-            <a:off x="9072245" y="1409700"/>
-            <a:ext cx="1897380" cy="2762885"/>
+            <a:off x="9115425" y="1401445"/>
+            <a:ext cx="2094230" cy="2763520"/>
           </a:xfrm>
           <a:prstGeom prst="rect"/>
           <a:noFill/>

</xml_diff>

<commit_message>
Added animation retargeting tutorial renewal
- Add and delete resource data

- Create animated avatars and set up
  humanoids
</commit_message>
<xml_diff>
--- a/Assets/Class/Animator & Blend Tree/PPT Data/Animation Example.pptx
+++ b/Assets/Class/Animator & Blend Tree/PPT Data/Animation Example.pptx
@@ -2,7 +2,7 @@
 <file path=ppt/presentation.xml><?xml version="1.0" encoding="utf-8"?>
 <p:presentation xmlns:a="http://schemas.openxmlformats.org/drawingml/2006/main" xmlns:r="http://schemas.openxmlformats.org/officeDocument/2006/relationships" xmlns:p="http://schemas.openxmlformats.org/presentationml/2006/main" xmlns:p14="http://schemas.microsoft.com/office/powerpoint/2010/main" saveSubsetFonts="1" firstSlideNum="0">
   <p:sldMasterIdLst>
-    <p:sldMasterId id="2147486214" r:id="rId12"/>
+    <p:sldMasterId id="2147486221" r:id="rId12"/>
   </p:sldMasterIdLst>
   <p:notesMasterIdLst>
     <p:notesMasterId r:id="rId14"/>
@@ -13,25 +13,25 @@
     <p:sldId id="296" r:id="rId20"/>
     <p:sldId id="316" r:id="rId22"/>
     <p:sldId id="291" r:id="rId24"/>
-    <p:sldId id="297" r:id="rId25"/>
-    <p:sldId id="298" r:id="rId26"/>
-    <p:sldId id="299" r:id="rId28"/>
-    <p:sldId id="300" r:id="rId30"/>
-    <p:sldId id="301" r:id="rId31"/>
-    <p:sldId id="302" r:id="rId32"/>
-    <p:sldId id="292" r:id="rId33"/>
-    <p:sldId id="303" r:id="rId35"/>
-    <p:sldId id="304" r:id="rId36"/>
-    <p:sldId id="306" r:id="rId37"/>
-    <p:sldId id="307" r:id="rId39"/>
-    <p:sldId id="308" r:id="rId41"/>
-    <p:sldId id="309" r:id="rId43"/>
-    <p:sldId id="310" r:id="rId45"/>
-    <p:sldId id="311" r:id="rId47"/>
-    <p:sldId id="312" r:id="rId49"/>
-    <p:sldId id="313" r:id="rId51"/>
-    <p:sldId id="314" r:id="rId53"/>
-    <p:sldId id="315" r:id="rId55"/>
+    <p:sldId id="297" r:id="rId26"/>
+    <p:sldId id="298" r:id="rId27"/>
+    <p:sldId id="299" r:id="rId29"/>
+    <p:sldId id="300" r:id="rId31"/>
+    <p:sldId id="301" r:id="rId33"/>
+    <p:sldId id="302" r:id="rId35"/>
+    <p:sldId id="292" r:id="rId37"/>
+    <p:sldId id="303" r:id="rId39"/>
+    <p:sldId id="304" r:id="rId41"/>
+    <p:sldId id="306" r:id="rId43"/>
+    <p:sldId id="307" r:id="rId45"/>
+    <p:sldId id="308" r:id="rId47"/>
+    <p:sldId id="309" r:id="rId49"/>
+    <p:sldId id="310" r:id="rId51"/>
+    <p:sldId id="311" r:id="rId53"/>
+    <p:sldId id="312" r:id="rId55"/>
+    <p:sldId id="313" r:id="rId57"/>
+    <p:sldId id="314" r:id="rId59"/>
+    <p:sldId id="315" r:id="rId61"/>
   </p:sldIdLst>
   <p:sldSz cx="12192000" cy="6858000"/>
   <p:notesSz cx="6858000" cy="9144000"/>
@@ -8899,9 +8899,9 @@
           <p:nvPr/>
         </p:nvSpPr>
         <p:spPr>
-          <a:xfrm rot="0">
+          <a:xfrm>
             <a:off x="1263650" y="5208905"/>
-            <a:ext cx="4140835" cy="955040"/>
+            <a:ext cx="4141470" cy="954405"/>
           </a:xfrm>
           <a:prstGeom prst="rect"/>
           <a:noFill/>
@@ -8942,147 +8942,35 @@
                 <a:latin typeface="맑은 고딕" charset="0"/>
                 <a:ea typeface="맑은 고딕" charset="0"/>
               </a:rPr>
-              <a:t>Google에</a:t>
+              <a:t>첫 번째로 </a:t>
             </a:r>
             <a:r>
               <a:rPr lang="ko-KR" sz="2000">
                 <a:latin typeface="맑은 고딕" charset="0"/>
                 <a:ea typeface="맑은 고딕" charset="0"/>
               </a:rPr>
-              <a:t> </a:t>
+              <a:t>Google에 </a:t>
             </a:r>
             <a:r>
               <a:rPr lang="ko-KR" sz="1800">
                 <a:latin typeface="맑은 고딕" charset="0"/>
                 <a:ea typeface="맑은 고딕" charset="0"/>
               </a:rPr>
-              <a:t>mixamo라고</a:t>
+              <a:t>mixamo라고 검색한 다음 사이트에 접속하여 Sig</a:t>
             </a:r>
             <a:r>
               <a:rPr lang="ko-KR" sz="1800">
                 <a:latin typeface="맑은 고딕" charset="0"/>
                 <a:ea typeface="맑은 고딕" charset="0"/>
               </a:rPr>
-              <a:t> </a:t>
+              <a:t>n</a:t>
             </a:r>
             <a:r>
               <a:rPr lang="ko-KR" sz="1800">
                 <a:latin typeface="맑은 고딕" charset="0"/>
                 <a:ea typeface="맑은 고딕" charset="0"/>
               </a:rPr>
-              <a:t>검색한</a:t>
-            </a:r>
-            <a:r>
-              <a:rPr lang="ko-KR" sz="1800">
-                <a:latin typeface="맑은 고딕" charset="0"/>
-                <a:ea typeface="맑은 고딕" charset="0"/>
-              </a:rPr>
-              <a:t> </a:t>
-            </a:r>
-            <a:r>
-              <a:rPr lang="ko-KR" sz="1800">
-                <a:latin typeface="맑은 고딕" charset="0"/>
-                <a:ea typeface="맑은 고딕" charset="0"/>
-              </a:rPr>
-              <a:t>다음</a:t>
-            </a:r>
-            <a:r>
-              <a:rPr lang="ko-KR" sz="1800">
-                <a:latin typeface="맑은 고딕" charset="0"/>
-                <a:ea typeface="맑은 고딕" charset="0"/>
-              </a:rPr>
-              <a:t> </a:t>
-            </a:r>
-            <a:r>
-              <a:rPr lang="ko-KR" sz="1800">
-                <a:latin typeface="맑은 고딕" charset="0"/>
-                <a:ea typeface="맑은 고딕" charset="0"/>
-              </a:rPr>
-              <a:t>사이트에</a:t>
-            </a:r>
-            <a:r>
-              <a:rPr lang="ko-KR" sz="1800">
-                <a:latin typeface="맑은 고딕" charset="0"/>
-                <a:ea typeface="맑은 고딕" charset="0"/>
-              </a:rPr>
-              <a:t> </a:t>
-            </a:r>
-            <a:r>
-              <a:rPr lang="ko-KR" sz="1800">
-                <a:latin typeface="맑은 고딕" charset="0"/>
-                <a:ea typeface="맑은 고딕" charset="0"/>
-              </a:rPr>
-              <a:t>접속하여</a:t>
-            </a:r>
-            <a:r>
-              <a:rPr lang="ko-KR" sz="1800">
-                <a:latin typeface="맑은 고딕" charset="0"/>
-                <a:ea typeface="맑은 고딕" charset="0"/>
-              </a:rPr>
-              <a:t> </a:t>
-            </a:r>
-            <a:r>
-              <a:rPr lang="ko-KR" sz="1800">
-                <a:latin typeface="맑은 고딕" charset="0"/>
-                <a:ea typeface="맑은 고딕" charset="0"/>
-              </a:rPr>
-              <a:t>Sige</a:t>
-            </a:r>
-            <a:r>
-              <a:rPr lang="ko-KR" sz="1800">
-                <a:latin typeface="맑은 고딕" charset="0"/>
-                <a:ea typeface="맑은 고딕" charset="0"/>
-              </a:rPr>
-              <a:t> </a:t>
-            </a:r>
-            <a:r>
-              <a:rPr lang="ko-KR" sz="1800">
-                <a:latin typeface="맑은 고딕" charset="0"/>
-                <a:ea typeface="맑은 고딕" charset="0"/>
-              </a:rPr>
-              <a:t>Up</a:t>
-            </a:r>
-            <a:r>
-              <a:rPr lang="ko-KR" sz="1800">
-                <a:latin typeface="맑은 고딕" charset="0"/>
-                <a:ea typeface="맑은 고딕" charset="0"/>
-              </a:rPr>
-              <a:t> </a:t>
-            </a:r>
-            <a:r>
-              <a:rPr lang="ko-KR" sz="1800">
-                <a:latin typeface="맑은 고딕" charset="0"/>
-                <a:ea typeface="맑은 고딕" charset="0"/>
-              </a:rPr>
-              <a:t>for</a:t>
-            </a:r>
-            <a:r>
-              <a:rPr lang="ko-KR" sz="1800">
-                <a:latin typeface="맑은 고딕" charset="0"/>
-                <a:ea typeface="맑은 고딕" charset="0"/>
-              </a:rPr>
-              <a:t> </a:t>
-            </a:r>
-            <a:r>
-              <a:rPr lang="ko-KR" sz="1800">
-                <a:latin typeface="맑은 고딕" charset="0"/>
-                <a:ea typeface="맑은 고딕" charset="0"/>
-              </a:rPr>
-              <a:t>Free를</a:t>
-            </a:r>
-            <a:r>
-              <a:rPr lang="ko-KR" sz="1800">
-                <a:latin typeface="맑은 고딕" charset="0"/>
-                <a:ea typeface="맑은 고딕" charset="0"/>
-              </a:rPr>
-              <a:t> </a:t>
-            </a:r>
-            <a:r>
-              <a:rPr lang="ko-KR" sz="1800">
-                <a:latin typeface="맑은 고딕" charset="0"/>
-                <a:ea typeface="맑은 고딕" charset="0"/>
-              </a:rPr>
-              <a:t>선택합니다.</a:t>
+              <a:t> Up for Free를 선택합니다.</a:t>
             </a:r>
             <a:endParaRPr lang="ko-KR" altLang="en-US" sz="1800">
               <a:latin typeface="맑은 고딕" charset="0"/>
@@ -9176,7 +9064,7 @@
       </p:pic>
       <p:pic>
         <p:nvPicPr>
-          <p:cNvPr id="1155" name="그림 52" descr="C:/Users/Admin1/AppData/Roaming/PolarisOffice/ETemp/21372_12698968/fImage211862728467.png"/>
+          <p:cNvPr id="1155" name="그림 52"/>
           <p:cNvPicPr>
             <a:picLocks noChangeAspect="1"/>
           </p:cNvPicPr>
@@ -13333,7 +13221,7 @@
         <p:spPr>
           <a:xfrm rot="0">
             <a:off x="1222375" y="5448300"/>
-            <a:ext cx="4141470" cy="678815"/>
+            <a:ext cx="4142105" cy="679450"/>
           </a:xfrm>
           <a:prstGeom prst="rect"/>
           <a:noFill/>
@@ -13439,7 +13327,7 @@
       </p:sp>
       <p:pic>
         <p:nvPicPr>
-          <p:cNvPr id="1156" name="그림 54" descr="C:/Users/Admin1/AppData/Roaming/PolarisOffice/ETemp/21372_12698968/fImage4065842826334.png"/>
+          <p:cNvPr id="1156" name="그림 54" descr="C:/Users/Admin1/AppData/Roaming/PolarisOffice/ETemp/3400_14330424/fImage4065842826334.png"/>
           <p:cNvPicPr>
             <a:picLocks noChangeAspect="1"/>
           </p:cNvPicPr>
@@ -13460,7 +13348,7 @@
         <p:spPr>
           <a:xfrm rot="0">
             <a:off x="1222375" y="1363345"/>
-            <a:ext cx="4141470" cy="3949065"/>
+            <a:ext cx="4142105" cy="3949700"/>
           </a:xfrm>
           <a:prstGeom prst="rect"/>
           <a:noFill/>
@@ -13499,7 +13387,7 @@
       </p:pic>
       <p:pic>
         <p:nvPicPr>
-          <p:cNvPr id="1158" name="그림 56"/>
+          <p:cNvPr id="1158" name="그림 56" descr="C:/Users/Admin1/AppData/Roaming/PolarisOffice/ETemp/3400_14330424/fImage106292849169.png"/>
           <p:cNvPicPr>
             <a:picLocks noChangeAspect="1"/>
           </p:cNvPicPr>
@@ -13520,7 +13408,7 @@
         <p:spPr>
           <a:xfrm rot="0">
             <a:off x="6821805" y="4274820"/>
-            <a:ext cx="744220" cy="868045"/>
+            <a:ext cx="945515" cy="1036320"/>
           </a:xfrm>
           <a:prstGeom prst="roundRect"/>
           <a:solidFill>
@@ -13538,8 +13426,8 @@
         </p:nvSpPr>
         <p:spPr>
           <a:xfrm rot="0">
-            <a:off x="6831330" y="5446395"/>
-            <a:ext cx="4250690" cy="677545"/>
+            <a:off x="6840220" y="5446395"/>
+            <a:ext cx="4251325" cy="677545"/>
           </a:xfrm>
           <a:prstGeom prst="rect"/>
           <a:noFill/>
@@ -13582,67 +13470,9 @@
           </a:p>
         </p:txBody>
       </p:sp>
-      <p:sp>
-        <p:nvSpPr>
-          <p:cNvPr id="1161" name="도형 63"/>
-          <p:cNvSpPr>
-            <a:spLocks/>
-          </p:cNvSpPr>
-          <p:nvPr/>
-        </p:nvSpPr>
-        <p:spPr>
-          <a:xfrm rot="0">
-            <a:off x="7689850" y="4545965"/>
-            <a:ext cx="334010" cy="328930"/>
-          </a:xfrm>
-          <a:prstGeom prst="notchedRightArrow"/>
-          <a:scene3d>
-            <a:camera prst="orthographicFront"/>
-            <a:lightRig rig="threePt" dir="t"/>
-          </a:scene3d>
-          <a:sp3d prstMaterial="warmMatte">
-            <a:bevelT w="76200" h="76200" prst="circle"/>
-            <a:contourClr>
-              <a:srgbClr val="000000"/>
-            </a:contourClr>
-          </a:sp3d>
-        </p:spPr>
-        <p:style>
-          <a:lnRef idx="2">
-            <a:schemeClr val="accent1">
-              <a:shade val="50000"/>
-            </a:schemeClr>
-          </a:lnRef>
-          <a:fillRef idx="1">
-            <a:schemeClr val="accent1"/>
-          </a:fillRef>
-          <a:effectRef idx="0">
-            <a:schemeClr val="accent1"/>
-          </a:effectRef>
-          <a:fontRef idx="minor">
-            <a:schemeClr val="lt1"/>
-          </a:fontRef>
-        </p:style>
-        <p:txBody>
-          <a:bodyPr wrap="square" lIns="91440" tIns="45720" rIns="91440" bIns="45720" numCol="1" vert="horz" anchor="ctr">
-            <a:noAutofit/>
-          </a:bodyPr>
-          <a:lstStyle/>
-          <a:p>
-            <a:pPr marL="0" indent="0" algn="ctr" latinLnBrk="0" hangingPunct="1">
-              <a:buFontTx/>
-              <a:buNone/>
-            </a:pPr>
-            <a:endParaRPr lang="ko-KR" altLang="en-US" sz="1800">
-              <a:latin typeface="맑은 고딕" charset="0"/>
-              <a:ea typeface="맑은 고딕" charset="0"/>
-            </a:endParaRPr>
-          </a:p>
-        </p:txBody>
-      </p:sp>
       <p:pic>
         <p:nvPicPr>
-          <p:cNvPr id="1162" name="그림 66"/>
+          <p:cNvPr id="1162" name="그림 66" descr="C:/Users/Admin1/AppData/Roaming/PolarisOffice/ETemp/3400_14330424/fImage75242895724.png"/>
           <p:cNvPicPr>
             <a:picLocks noChangeAspect="1"/>
           </p:cNvPicPr>
@@ -13662,13 +13492,42 @@
         </p:blipFill>
         <p:spPr>
           <a:xfrm rot="0">
-            <a:off x="8204200" y="4272280"/>
-            <a:ext cx="2880360" cy="874395"/>
+            <a:off x="8545195" y="4272280"/>
+            <a:ext cx="2540000" cy="1038860"/>
           </a:xfrm>
           <a:prstGeom prst="roundRect"/>
           <a:solidFill>
             <a:srgbClr val="EDEDED"/>
           </a:solidFill>
+        </p:spPr>
+      </p:pic>
+      <p:pic>
+        <p:nvPicPr>
+          <p:cNvPr id="1163" name="그림 4" descr="C:/Users/Admin1/AppData/Roaming/PolarisOffice/ETemp/3400_14330424/fImage22421734441.png"/>
+          <p:cNvPicPr>
+            <a:picLocks noChangeAspect="1"/>
+          </p:cNvPicPr>
+          <p:nvPr/>
+        </p:nvPicPr>
+        <p:blipFill rotWithShape="1">
+          <a:blip r:embed="rId7" cstate="print">
+            <a:extLst>
+              <a:ext uri="{28A0092B-C50C-407E-A947-70E740481C1C}">
+                <a14:useLocalDpi xmlns:a14="http://schemas.microsoft.com/office/drawing/2010/main" val="0"/>
+              </a:ext>
+            </a:extLst>
+          </a:blip>
+          <a:stretch>
+            <a:fillRect/>
+          </a:stretch>
+        </p:blipFill>
+        <p:spPr>
+          <a:xfrm rot="0">
+            <a:off x="7914005" y="4592320"/>
+            <a:ext cx="528955" cy="424180"/>
+          </a:xfrm>
+          <a:prstGeom prst="rect"/>
+          <a:noFill/>
         </p:spPr>
       </p:pic>
     </p:spTree>
@@ -15911,8 +15770,8 @@
         </p:nvSpPr>
         <p:spPr>
           <a:xfrm rot="0">
-            <a:off x="1222375" y="5438775"/>
-            <a:ext cx="4173855" cy="678180"/>
+            <a:off x="1222375" y="5534025"/>
+            <a:ext cx="4174490" cy="678815"/>
           </a:xfrm>
           <a:prstGeom prst="rect"/>
           <a:noFill/>
@@ -16026,8 +15885,8 @@
         </p:nvSpPr>
         <p:spPr>
           <a:xfrm rot="0">
-            <a:off x="6831965" y="5466080"/>
-            <a:ext cx="4257675" cy="647065"/>
+            <a:off x="6823075" y="5561330"/>
+            <a:ext cx="4258310" cy="647700"/>
           </a:xfrm>
           <a:prstGeom prst="rect"/>
           <a:noFill/>
@@ -16058,14 +15917,7 @@
                 <a:latin typeface="맑은 고딕" charset="0"/>
                 <a:ea typeface="맑은 고딕" charset="0"/>
               </a:rPr>
-              <a:t>게임 오브젝트의 애니메이션을 제어하는 컴포넌트</a:t>
-            </a:r>
-            <a:r>
-              <a:rPr lang="ko-KR" altLang="en-US" sz="1800">
-                <a:latin typeface="맑은 고딕" charset="0"/>
-                <a:ea typeface="맑은 고딕" charset="0"/>
-              </a:rPr>
-              <a:t>입니다.</a:t>
+              <a:t>게임 오브젝트의 애니메이션을 제어하는 컴포넌트입니다.</a:t>
             </a:r>
             <a:endParaRPr lang="ko-KR" altLang="en-US" sz="1800">
               <a:latin typeface="맑은 고딕" charset="0"/>
@@ -16401,17 +16253,17 @@
       </p:sp>
       <p:pic>
         <p:nvPicPr>
-          <p:cNvPr id="1171" name="그림 14"/>
+          <p:cNvPr id="1171" name="그림 14" descr="C:/Users/Admin1/AppData/Roaming/PolarisOffice/ETemp/3400_14330424/fImage2446744741.png"/>
           <p:cNvPicPr>
             <a:picLocks noChangeAspect="1"/>
           </p:cNvPicPr>
           <p:nvPr/>
         </p:nvPicPr>
         <p:blipFill rotWithShape="1">
-          <a:blip r:embed="rId10" cstate="print">
+          <a:blip r:embed="rId10" cstate="hqprint">
             <a:extLst>
               <a:ext uri="{28A0092B-C50C-407E-A947-70E740481C1C}">
-                <a14:useLocalDpi xmlns:a14="http://schemas.microsoft.com/office/drawing/2010/main" val="0"/>
+                <a14:useLocalDpi xmlns:a14="http://schemas.microsoft.com/office/drawing/2010/main"/>
               </a:ext>
             </a:extLst>
           </a:blip>
@@ -16421,8 +16273,8 @@
         </p:blipFill>
         <p:spPr>
           <a:xfrm rot="0">
-            <a:off x="6838950" y="3295650"/>
-            <a:ext cx="4239260" cy="1972310"/>
+            <a:off x="6815455" y="3235325"/>
+            <a:ext cx="4263390" cy="2136775"/>
           </a:xfrm>
           <a:prstGeom prst="roundRect"/>
           <a:solidFill>
@@ -16550,8 +16402,8 @@
         </p:nvSpPr>
         <p:spPr>
           <a:xfrm rot="0">
-            <a:off x="1336040" y="5247005"/>
-            <a:ext cx="4055745" cy="677545"/>
+            <a:off x="1379220" y="5168900"/>
+            <a:ext cx="4056380" cy="954405"/>
           </a:xfrm>
           <a:prstGeom prst="rect"/>
           <a:noFill/>
@@ -16585,7 +16437,14 @@
                 <a:latin typeface="맑은 고딕" charset="0"/>
                 <a:ea typeface="맑은 고딕" charset="0"/>
               </a:rPr>
-              <a:t>그다음으로 Animator Controller를 생성합니다.</a:t>
+              <a:t>그다음으로 </a:t>
+            </a:r>
+            <a:r>
+              <a:rPr sz="1800">
+                <a:latin typeface="맑은 고딕" charset="0"/>
+                <a:ea typeface="맑은 고딕" charset="0"/>
+              </a:rPr>
+              <a:t>Project 폴더에 있는 Animator 폴더에 Animator Controller를 생성합니다.</a:t>
             </a:r>
             <a:endParaRPr lang="ko-KR" altLang="en-US" sz="1800">
               <a:latin typeface="맑은 고딕" charset="0"/>
@@ -16596,7 +16455,7 @@
       </p:sp>
       <p:pic>
         <p:nvPicPr>
-          <p:cNvPr id="1171" name="Picture " descr="C:/Users/Admin1/AppData/Roaming/PolarisOffice/ETemp/21372_12698968/fImage415713108145.png"/>
+          <p:cNvPr id="1171" name="Picture " descr="C:/Users/Admin1/AppData/Roaming/PolarisOffice/ETemp/3400_14330424/fImage415713108145.png"/>
           <p:cNvPicPr>
             <a:picLocks noChangeAspect="1"/>
           </p:cNvPicPr>
@@ -16617,7 +16476,7 @@
         <p:spPr>
           <a:xfrm rot="0">
             <a:off x="1329055" y="1361440"/>
-            <a:ext cx="4053840" cy="3818255"/>
+            <a:ext cx="4054475" cy="3681095"/>
           </a:xfrm>
           <a:prstGeom prst="roundRect"/>
           <a:solidFill>
@@ -16635,8 +16494,8 @@
         </p:nvSpPr>
         <p:spPr>
           <a:xfrm rot="0">
-            <a:off x="6821170" y="2397760"/>
-            <a:ext cx="4152900" cy="954405"/>
+            <a:off x="6821170" y="2570480"/>
+            <a:ext cx="4153535" cy="955040"/>
           </a:xfrm>
           <a:prstGeom prst="rect"/>
           <a:noFill/>
@@ -16670,21 +16529,7 @@
                 <a:latin typeface="맑은 고딕" charset="0"/>
                 <a:ea typeface="맑은 고딕" charset="0"/>
               </a:rPr>
-              <a:t>그리고 </a:t>
-            </a:r>
-            <a:r>
-              <a:rPr lang="ko-KR" sz="1800">
-                <a:latin typeface="맑은 고딕" charset="0"/>
-                <a:ea typeface="맑은 고딕" charset="0"/>
-              </a:rPr>
-              <a:t>Dreyar By M.Aure 오브젝트</a:t>
-            </a:r>
-            <a:r>
-              <a:rPr lang="ko-KR" sz="1800">
-                <a:latin typeface="맑은 고딕" charset="0"/>
-                <a:ea typeface="맑은 고딕" charset="0"/>
-              </a:rPr>
-              <a:t>에 방금 생성한 Animator Controller를 넣어줍니다.</a:t>
+              <a:t>그리고 Dreyar By M.Aure 오브젝트에 방금 생성한 Animator Controller를 넣어줍니다.</a:t>
             </a:r>
             <a:endParaRPr lang="ko-KR" altLang="en-US" sz="1800">
               <a:latin typeface="맑은 고딕" charset="0"/>
@@ -16695,17 +16540,17 @@
       </p:sp>
       <p:pic>
         <p:nvPicPr>
-          <p:cNvPr id="1177" name="그림 5" descr="C:/Users/Admin1/AppData/Roaming/PolarisOffice/ETemp/21372_12698968/fImage455135641.png"/>
+          <p:cNvPr id="1177" name="그림 5" descr="C:/Users/Admin1/AppData/Roaming/PolarisOffice/ETemp/3400_14330424/fImage455135641.png"/>
           <p:cNvPicPr>
             <a:picLocks noChangeAspect="1"/>
           </p:cNvPicPr>
           <p:nvPr/>
         </p:nvPicPr>
         <p:blipFill rotWithShape="1">
-          <a:blip r:embed="rId5" cstate="print">
+          <a:blip r:embed="rId5" cstate="hqprint">
             <a:extLst>
               <a:ext uri="{28A0092B-C50C-407E-A947-70E740481C1C}">
-                <a14:useLocalDpi xmlns:a14="http://schemas.microsoft.com/office/drawing/2010/main" val="0"/>
+                <a14:useLocalDpi xmlns:a14="http://schemas.microsoft.com/office/drawing/2010/main"/>
               </a:ext>
             </a:extLst>
           </a:blip>
@@ -16716,7 +16561,7 @@
         <p:spPr>
           <a:xfrm rot="0">
             <a:off x="8221345" y="1364615"/>
-            <a:ext cx="2751455" cy="922020"/>
+            <a:ext cx="2752090" cy="1118235"/>
           </a:xfrm>
           <a:prstGeom prst="roundRect"/>
           <a:solidFill>
@@ -16726,7 +16571,7 @@
       </p:pic>
       <p:pic>
         <p:nvPicPr>
-          <p:cNvPr id="1178" name="그림 8" descr="C:/Users/Admin1/AppData/Roaming/PolarisOffice/ETemp/21372_12698968/fImage42973039358.png"/>
+          <p:cNvPr id="1178" name="그림 8" descr="C:/Users/Admin1/AppData/Roaming/PolarisOffice/ETemp/3400_14330424/fImage42973039358.png"/>
           <p:cNvPicPr>
             <a:picLocks noChangeAspect="1"/>
           </p:cNvPicPr>
@@ -16747,7 +16592,7 @@
         <p:spPr>
           <a:xfrm rot="0">
             <a:off x="6822440" y="1371600"/>
-            <a:ext cx="1183640" cy="915035"/>
+            <a:ext cx="1184275" cy="1109345"/>
           </a:xfrm>
           <a:prstGeom prst="roundRect"/>
           <a:solidFill>
@@ -16763,13 +16608,12 @@
         </p:nvCxnSpPr>
         <p:spPr>
           <a:xfrm rot="0" flipH="1">
-            <a:off x="7947025" y="2103120"/>
-            <a:ext cx="349885" cy="635"/>
+            <a:off x="7955915" y="2241550"/>
+            <a:ext cx="350520" cy="1270"/>
           </a:xfrm>
           <a:prstGeom prst="straightConnector1"/>
           <a:ln w="6350" cap="flat" cmpd="sng">
             <a:prstDash/>
-            <a:headEnd type="none" w="med" len="med"/>
             <a:tailEnd type="triangle" w="med" len="med"/>
           </a:ln>
         </p:spPr>
@@ -16790,17 +16634,17 @@
       </p:cxnSp>
       <p:pic>
         <p:nvPicPr>
-          <p:cNvPr id="1180" name="그림 10" descr="C:/Users/Admin1/AppData/Roaming/PolarisOffice/ETemp/21372_12698968/fImage127933598467.png"/>
+          <p:cNvPr id="1180" name="그림 10" descr="C:/Users/Admin1/AppData/Roaming/PolarisOffice/ETemp/3400_14330424/fImage127933598467.png"/>
           <p:cNvPicPr>
             <a:picLocks noChangeAspect="1"/>
           </p:cNvPicPr>
           <p:nvPr/>
         </p:nvPicPr>
         <p:blipFill rotWithShape="1">
-          <a:blip r:embed="rId7" cstate="print">
+          <a:blip r:embed="rId7" cstate="hqprint">
             <a:extLst>
               <a:ext uri="{28A0092B-C50C-407E-A947-70E740481C1C}">
-                <a14:useLocalDpi xmlns:a14="http://schemas.microsoft.com/office/drawing/2010/main" val="0"/>
+                <a14:useLocalDpi xmlns:a14="http://schemas.microsoft.com/office/drawing/2010/main"/>
               </a:ext>
             </a:extLst>
           </a:blip>
@@ -16810,8 +16654,8 @@
         </p:blipFill>
         <p:spPr>
           <a:xfrm rot="0">
-            <a:off x="6824980" y="3481070"/>
-            <a:ext cx="4146550" cy="1636395"/>
+            <a:off x="6824980" y="3670935"/>
+            <a:ext cx="4147185" cy="1637030"/>
           </a:xfrm>
           <a:prstGeom prst="roundRect"/>
           <a:solidFill>
@@ -16829,8 +16673,8 @@
         </p:nvSpPr>
         <p:spPr>
           <a:xfrm rot="0">
-            <a:off x="6825615" y="5248275"/>
-            <a:ext cx="4152900" cy="677545"/>
+            <a:off x="6834505" y="5447030"/>
+            <a:ext cx="4153535" cy="678180"/>
           </a:xfrm>
           <a:prstGeom prst="rect"/>
           <a:noFill/>
@@ -16857,27 +16701,7 @@
                 <a:latin typeface="맑은 고딕" charset="0"/>
                 <a:ea typeface="맑은 고딕" charset="0"/>
               </a:rPr>
-              <a:t>1</a:t>
-            </a:r>
-            <a:r>
-              <a:rPr lang="ko-KR" sz="2000" b="1">
-                <a:solidFill>
-                  <a:srgbClr val="0611F2"/>
-                </a:solidFill>
-                <a:latin typeface="맑은 고딕" charset="0"/>
-                <a:ea typeface="맑은 고딕" charset="0"/>
-              </a:rPr>
-              <a:t>1</a:t>
-            </a:r>
-            <a:r>
-              <a:rPr lang="ko-KR" sz="2000" b="1">
-                <a:solidFill>
-                  <a:srgbClr val="0611F2"/>
-                </a:solidFill>
-                <a:latin typeface="맑은 고딕" charset="0"/>
-                <a:ea typeface="맑은 고딕" charset="0"/>
-              </a:rPr>
-              <a:t>. </a:t>
+              <a:t>11. </a:t>
             </a:r>
             <a:r>
               <a:rPr lang="ko-KR" sz="1800">
@@ -17509,7 +17333,7 @@
       </p:sp>
       <p:pic>
         <p:nvPicPr>
-          <p:cNvPr id="1166" name="그림 108"/>
+          <p:cNvPr id="1166" name="그림 108" descr="C:/Users/Admin1/AppData/Roaming/PolarisOffice/ETemp/10512_21871896/fImage113473461942.png"/>
           <p:cNvPicPr>
             <a:picLocks noChangeAspect="1"/>
           </p:cNvPicPr>
@@ -17530,12 +17354,10 @@
         <p:spPr>
           <a:xfrm rot="0">
             <a:off x="1336040" y="1409065"/>
-            <a:ext cx="3999865" cy="2990215"/>
-          </a:xfrm>
-          <a:prstGeom prst="roundRect"/>
-          <a:solidFill>
-            <a:srgbClr val="EDEDED"/>
-          </a:solidFill>
+            <a:ext cx="4000500" cy="2990850"/>
+          </a:xfrm>
+          <a:prstGeom prst="rect"/>
+          <a:noFill/>
         </p:spPr>
       </p:pic>
       <p:pic>

</xml_diff>